<commit_message>
Added work models and high prototype. Plus pictures.
</commit_message>
<xml_diff>
--- a/TeamOctopus/phase6/team_Octopus_Presentation.pptx
+++ b/TeamOctopus/phase6/team_Octopus_Presentation.pptx
@@ -5,7 +5,7 @@
     <p:sldMasterId id="2147483648" r:id="rId1"/>
   </p:sldMasterIdLst>
   <p:notesMasterIdLst>
-    <p:notesMasterId r:id="rId7"/>
+    <p:notesMasterId r:id="rId16"/>
   </p:notesMasterIdLst>
   <p:sldIdLst>
     <p:sldId id="256" r:id="rId2"/>
@@ -13,6 +13,15 @@
     <p:sldId id="258" r:id="rId4"/>
     <p:sldId id="259" r:id="rId5"/>
     <p:sldId id="260" r:id="rId6"/>
+    <p:sldId id="264" r:id="rId7"/>
+    <p:sldId id="265" r:id="rId8"/>
+    <p:sldId id="266" r:id="rId9"/>
+    <p:sldId id="267" r:id="rId10"/>
+    <p:sldId id="268" r:id="rId11"/>
+    <p:sldId id="269" r:id="rId12"/>
+    <p:sldId id="261" r:id="rId13"/>
+    <p:sldId id="262" r:id="rId14"/>
+    <p:sldId id="263" r:id="rId15"/>
   </p:sldIdLst>
   <p:sldSz cx="12192000" cy="6858000"/>
   <p:notesSz cx="6858000" cy="9144000"/>
@@ -111,6 +120,11 @@
       </a:defRPr>
     </a:lvl9pPr>
   </p:defaultTextStyle>
+  <p:extLst>
+    <p:ext uri="{EFAFB233-063F-42B5-8137-9DF3F51BA10A}">
+      <p15:sldGuideLst xmlns:p15="http://schemas.microsoft.com/office/powerpoint/2012/main"/>
+    </p:ext>
+  </p:extLst>
 </p:presentation>
 </file>
 
@@ -196,7 +210,7 @@
           <a:p>
             <a:fld id="{75AA5801-58E2-1A47-AB77-D5E8F4F0FF0A}" type="datetimeFigureOut">
               <a:rPr lang="en-US" smtClean="0"/>
-              <a:t>11/29/15</a:t>
+              <a:t>11/30/2015</a:t>
             </a:fld>
             <a:endParaRPr lang="en-US"/>
           </a:p>
@@ -679,7 +693,7 @@
           <a:p>
             <a:fld id="{5EA88037-1F7C-7846-8515-279FA3F1A194}" type="datetimeFigureOut">
               <a:rPr lang="en-US" smtClean="0"/>
-              <a:t>11/29/15</a:t>
+              <a:t>11/30/2015</a:t>
             </a:fld>
             <a:endParaRPr lang="en-US"/>
           </a:p>
@@ -849,7 +863,7 @@
           <a:p>
             <a:fld id="{5EA88037-1F7C-7846-8515-279FA3F1A194}" type="datetimeFigureOut">
               <a:rPr lang="en-US" smtClean="0"/>
-              <a:t>11/29/15</a:t>
+              <a:t>11/30/2015</a:t>
             </a:fld>
             <a:endParaRPr lang="en-US"/>
           </a:p>
@@ -1029,7 +1043,7 @@
           <a:p>
             <a:fld id="{5EA88037-1F7C-7846-8515-279FA3F1A194}" type="datetimeFigureOut">
               <a:rPr lang="en-US" smtClean="0"/>
-              <a:t>11/29/15</a:t>
+              <a:t>11/30/2015</a:t>
             </a:fld>
             <a:endParaRPr lang="en-US"/>
           </a:p>
@@ -1199,7 +1213,7 @@
           <a:p>
             <a:fld id="{5EA88037-1F7C-7846-8515-279FA3F1A194}" type="datetimeFigureOut">
               <a:rPr lang="en-US" smtClean="0"/>
-              <a:t>11/29/15</a:t>
+              <a:t>11/30/2015</a:t>
             </a:fld>
             <a:endParaRPr lang="en-US"/>
           </a:p>
@@ -1445,7 +1459,7 @@
           <a:p>
             <a:fld id="{5EA88037-1F7C-7846-8515-279FA3F1A194}" type="datetimeFigureOut">
               <a:rPr lang="en-US" smtClean="0"/>
-              <a:t>11/29/15</a:t>
+              <a:t>11/30/2015</a:t>
             </a:fld>
             <a:endParaRPr lang="en-US"/>
           </a:p>
@@ -1677,7 +1691,7 @@
           <a:p>
             <a:fld id="{5EA88037-1F7C-7846-8515-279FA3F1A194}" type="datetimeFigureOut">
               <a:rPr lang="en-US" smtClean="0"/>
-              <a:t>11/29/15</a:t>
+              <a:t>11/30/2015</a:t>
             </a:fld>
             <a:endParaRPr lang="en-US"/>
           </a:p>
@@ -2044,7 +2058,7 @@
           <a:p>
             <a:fld id="{5EA88037-1F7C-7846-8515-279FA3F1A194}" type="datetimeFigureOut">
               <a:rPr lang="en-US" smtClean="0"/>
-              <a:t>11/29/15</a:t>
+              <a:t>11/30/2015</a:t>
             </a:fld>
             <a:endParaRPr lang="en-US"/>
           </a:p>
@@ -2162,7 +2176,7 @@
           <a:p>
             <a:fld id="{5EA88037-1F7C-7846-8515-279FA3F1A194}" type="datetimeFigureOut">
               <a:rPr lang="en-US" smtClean="0"/>
-              <a:t>11/29/15</a:t>
+              <a:t>11/30/2015</a:t>
             </a:fld>
             <a:endParaRPr lang="en-US"/>
           </a:p>
@@ -2257,7 +2271,7 @@
           <a:p>
             <a:fld id="{5EA88037-1F7C-7846-8515-279FA3F1A194}" type="datetimeFigureOut">
               <a:rPr lang="en-US" smtClean="0"/>
-              <a:t>11/29/15</a:t>
+              <a:t>11/30/2015</a:t>
             </a:fld>
             <a:endParaRPr lang="en-US"/>
           </a:p>
@@ -2534,7 +2548,7 @@
           <a:p>
             <a:fld id="{5EA88037-1F7C-7846-8515-279FA3F1A194}" type="datetimeFigureOut">
               <a:rPr lang="en-US" smtClean="0"/>
-              <a:t>11/29/15</a:t>
+              <a:t>11/30/2015</a:t>
             </a:fld>
             <a:endParaRPr lang="en-US"/>
           </a:p>
@@ -2787,7 +2801,7 @@
           <a:p>
             <a:fld id="{5EA88037-1F7C-7846-8515-279FA3F1A194}" type="datetimeFigureOut">
               <a:rPr lang="en-US" smtClean="0"/>
-              <a:t>11/29/15</a:t>
+              <a:t>11/30/2015</a:t>
             </a:fld>
             <a:endParaRPr lang="en-US"/>
           </a:p>
@@ -3029,7 +3043,7 @@
           <a:p>
             <a:fld id="{5EA88037-1F7C-7846-8515-279FA3F1A194}" type="datetimeFigureOut">
               <a:rPr lang="en-US" smtClean="0"/>
-              <a:t>11/29/15</a:t>
+              <a:t>11/30/2015</a:t>
             </a:fld>
             <a:endParaRPr lang="en-US"/>
           </a:p>
@@ -3546,6 +3560,1188 @@
 </p:sld>
 </file>
 
+<file path=ppt/slides/slide10.xml><?xml version="1.0" encoding="utf-8"?>
+<p:sld xmlns:a="http://schemas.openxmlformats.org/drawingml/2006/main" xmlns:r="http://schemas.openxmlformats.org/officeDocument/2006/relationships" xmlns:p="http://schemas.openxmlformats.org/presentationml/2006/main">
+  <p:cSld>
+    <p:spTree>
+      <p:nvGrpSpPr>
+        <p:cNvPr id="1" name=""/>
+        <p:cNvGrpSpPr/>
+        <p:nvPr/>
+      </p:nvGrpSpPr>
+      <p:grpSpPr>
+        <a:xfrm>
+          <a:off x="0" y="0"/>
+          <a:ext cx="0" cy="0"/>
+          <a:chOff x="0" y="0"/>
+          <a:chExt cx="0" cy="0"/>
+        </a:xfrm>
+      </p:grpSpPr>
+      <p:sp>
+        <p:nvSpPr>
+          <p:cNvPr id="2" name="Title 1"/>
+          <p:cNvSpPr>
+            <a:spLocks noGrp="1"/>
+          </p:cNvSpPr>
+          <p:nvPr>
+            <p:ph type="title"/>
+          </p:nvPr>
+        </p:nvSpPr>
+        <p:spPr/>
+        <p:txBody>
+          <a:bodyPr/>
+          <a:lstStyle/>
+          <a:p>
+            <a:pPr algn="ctr"/>
+            <a:r>
+              <a:rPr lang="en-US" dirty="0" smtClean="0"/>
+              <a:t>Artifact Model</a:t>
+            </a:r>
+            <a:endParaRPr lang="en-US" dirty="0"/>
+          </a:p>
+        </p:txBody>
+      </p:sp>
+      <p:sp>
+        <p:nvSpPr>
+          <p:cNvPr id="3" name="Content Placeholder 2"/>
+          <p:cNvSpPr>
+            <a:spLocks noGrp="1"/>
+          </p:cNvSpPr>
+          <p:nvPr>
+            <p:ph idx="1"/>
+          </p:nvPr>
+        </p:nvSpPr>
+        <p:spPr/>
+        <p:txBody>
+          <a:bodyPr/>
+          <a:lstStyle/>
+          <a:p>
+            <a:endParaRPr lang="en-US" dirty="0"/>
+          </a:p>
+        </p:txBody>
+      </p:sp>
+      <p:sp>
+        <p:nvSpPr>
+          <p:cNvPr id="4" name="TextBox 3"/>
+          <p:cNvSpPr txBox="1"/>
+          <p:nvPr/>
+        </p:nvSpPr>
+        <p:spPr>
+          <a:xfrm>
+            <a:off x="838200" y="6363222"/>
+            <a:ext cx="1591358" cy="369332"/>
+          </a:xfrm>
+          <a:prstGeom prst="rect">
+            <a:avLst/>
+          </a:prstGeom>
+          <a:noFill/>
+        </p:spPr>
+        <p:txBody>
+          <a:bodyPr wrap="square" rtlCol="0">
+            <a:spAutoFit/>
+          </a:bodyPr>
+          <a:lstStyle/>
+          <a:p>
+            <a:r>
+              <a:rPr lang="en-US" dirty="0" smtClean="0"/>
+              <a:t>Team Octopus</a:t>
+            </a:r>
+            <a:endParaRPr lang="en-US" dirty="0"/>
+          </a:p>
+        </p:txBody>
+      </p:sp>
+      <p:sp>
+        <p:nvSpPr>
+          <p:cNvPr id="5" name="TextBox 4"/>
+          <p:cNvSpPr txBox="1"/>
+          <p:nvPr/>
+        </p:nvSpPr>
+        <p:spPr>
+          <a:xfrm>
+            <a:off x="4385181" y="6363222"/>
+            <a:ext cx="3421637" cy="369332"/>
+          </a:xfrm>
+          <a:prstGeom prst="rect">
+            <a:avLst/>
+          </a:prstGeom>
+          <a:noFill/>
+        </p:spPr>
+        <p:txBody>
+          <a:bodyPr wrap="square" rtlCol="0">
+            <a:spAutoFit/>
+          </a:bodyPr>
+          <a:lstStyle/>
+          <a:p>
+            <a:r>
+              <a:rPr lang="en-US" dirty="0" smtClean="0"/>
+              <a:t>Work Models &amp; Affinity Diagram</a:t>
+            </a:r>
+            <a:endParaRPr lang="en-US" dirty="0"/>
+          </a:p>
+        </p:txBody>
+      </p:sp>
+      <p:sp>
+        <p:nvSpPr>
+          <p:cNvPr id="6" name="TextBox 5"/>
+          <p:cNvSpPr txBox="1"/>
+          <p:nvPr/>
+        </p:nvSpPr>
+        <p:spPr>
+          <a:xfrm>
+            <a:off x="8415555" y="6363222"/>
+            <a:ext cx="3062341" cy="369332"/>
+          </a:xfrm>
+          <a:prstGeom prst="rect">
+            <a:avLst/>
+          </a:prstGeom>
+          <a:noFill/>
+        </p:spPr>
+        <p:txBody>
+          <a:bodyPr wrap="square" rtlCol="0">
+            <a:spAutoFit/>
+          </a:bodyPr>
+          <a:lstStyle/>
+          <a:p>
+            <a:r>
+              <a:rPr lang="en-US" dirty="0" smtClean="0"/>
+              <a:t>Team Member: </a:t>
+            </a:r>
+            <a:r>
+              <a:rPr lang="en-US" dirty="0" smtClean="0"/>
+              <a:t>Jack Flowers</a:t>
+            </a:r>
+            <a:endParaRPr lang="en-US" dirty="0"/>
+          </a:p>
+        </p:txBody>
+      </p:sp>
+    </p:spTree>
+    <p:extLst>
+      <p:ext uri="{BB962C8B-B14F-4D97-AF65-F5344CB8AC3E}">
+        <p14:creationId xmlns:p14="http://schemas.microsoft.com/office/powerpoint/2010/main" val="1473682982"/>
+      </p:ext>
+    </p:extLst>
+  </p:cSld>
+  <p:clrMapOvr>
+    <a:masterClrMapping/>
+  </p:clrMapOvr>
+</p:sld>
+</file>
+
+<file path=ppt/slides/slide11.xml><?xml version="1.0" encoding="utf-8"?>
+<p:sld xmlns:a="http://schemas.openxmlformats.org/drawingml/2006/main" xmlns:r="http://schemas.openxmlformats.org/officeDocument/2006/relationships" xmlns:p="http://schemas.openxmlformats.org/presentationml/2006/main">
+  <p:cSld>
+    <p:spTree>
+      <p:nvGrpSpPr>
+        <p:cNvPr id="1" name=""/>
+        <p:cNvGrpSpPr/>
+        <p:nvPr/>
+      </p:nvGrpSpPr>
+      <p:grpSpPr>
+        <a:xfrm>
+          <a:off x="0" y="0"/>
+          <a:ext cx="0" cy="0"/>
+          <a:chOff x="0" y="0"/>
+          <a:chExt cx="0" cy="0"/>
+        </a:xfrm>
+      </p:grpSpPr>
+      <p:sp>
+        <p:nvSpPr>
+          <p:cNvPr id="2" name="Title 1"/>
+          <p:cNvSpPr>
+            <a:spLocks noGrp="1"/>
+          </p:cNvSpPr>
+          <p:nvPr>
+            <p:ph type="title"/>
+          </p:nvPr>
+        </p:nvSpPr>
+        <p:spPr/>
+        <p:txBody>
+          <a:bodyPr/>
+          <a:lstStyle/>
+          <a:p>
+            <a:pPr algn="ctr"/>
+            <a:r>
+              <a:rPr lang="en-US" dirty="0" smtClean="0"/>
+              <a:t>Physical Model</a:t>
+            </a:r>
+            <a:endParaRPr lang="en-US" dirty="0"/>
+          </a:p>
+        </p:txBody>
+      </p:sp>
+      <p:sp>
+        <p:nvSpPr>
+          <p:cNvPr id="3" name="Content Placeholder 2"/>
+          <p:cNvSpPr>
+            <a:spLocks noGrp="1"/>
+          </p:cNvSpPr>
+          <p:nvPr>
+            <p:ph idx="1"/>
+          </p:nvPr>
+        </p:nvSpPr>
+        <p:spPr/>
+        <p:txBody>
+          <a:bodyPr/>
+          <a:lstStyle/>
+          <a:p>
+            <a:endParaRPr lang="en-US"/>
+          </a:p>
+        </p:txBody>
+      </p:sp>
+      <p:sp>
+        <p:nvSpPr>
+          <p:cNvPr id="4" name="TextBox 3"/>
+          <p:cNvSpPr txBox="1"/>
+          <p:nvPr/>
+        </p:nvSpPr>
+        <p:spPr>
+          <a:xfrm>
+            <a:off x="838200" y="6363222"/>
+            <a:ext cx="1591358" cy="369332"/>
+          </a:xfrm>
+          <a:prstGeom prst="rect">
+            <a:avLst/>
+          </a:prstGeom>
+          <a:noFill/>
+        </p:spPr>
+        <p:txBody>
+          <a:bodyPr wrap="square" rtlCol="0">
+            <a:spAutoFit/>
+          </a:bodyPr>
+          <a:lstStyle/>
+          <a:p>
+            <a:r>
+              <a:rPr lang="en-US" dirty="0" smtClean="0"/>
+              <a:t>Team Octopus</a:t>
+            </a:r>
+            <a:endParaRPr lang="en-US" dirty="0"/>
+          </a:p>
+        </p:txBody>
+      </p:sp>
+      <p:sp>
+        <p:nvSpPr>
+          <p:cNvPr id="5" name="TextBox 4"/>
+          <p:cNvSpPr txBox="1"/>
+          <p:nvPr/>
+        </p:nvSpPr>
+        <p:spPr>
+          <a:xfrm>
+            <a:off x="4385181" y="6363222"/>
+            <a:ext cx="3421637" cy="369332"/>
+          </a:xfrm>
+          <a:prstGeom prst="rect">
+            <a:avLst/>
+          </a:prstGeom>
+          <a:noFill/>
+        </p:spPr>
+        <p:txBody>
+          <a:bodyPr wrap="square" rtlCol="0">
+            <a:spAutoFit/>
+          </a:bodyPr>
+          <a:lstStyle/>
+          <a:p>
+            <a:r>
+              <a:rPr lang="en-US" dirty="0" smtClean="0"/>
+              <a:t>Work Models &amp; Affinity Diagram</a:t>
+            </a:r>
+            <a:endParaRPr lang="en-US" dirty="0"/>
+          </a:p>
+        </p:txBody>
+      </p:sp>
+      <p:sp>
+        <p:nvSpPr>
+          <p:cNvPr id="6" name="TextBox 5"/>
+          <p:cNvSpPr txBox="1"/>
+          <p:nvPr/>
+        </p:nvSpPr>
+        <p:spPr>
+          <a:xfrm>
+            <a:off x="8415555" y="6363222"/>
+            <a:ext cx="3062341" cy="369332"/>
+          </a:xfrm>
+          <a:prstGeom prst="rect">
+            <a:avLst/>
+          </a:prstGeom>
+          <a:noFill/>
+        </p:spPr>
+        <p:txBody>
+          <a:bodyPr wrap="square" rtlCol="0">
+            <a:spAutoFit/>
+          </a:bodyPr>
+          <a:lstStyle/>
+          <a:p>
+            <a:r>
+              <a:rPr lang="en-US" dirty="0" smtClean="0"/>
+              <a:t>Team Member: </a:t>
+            </a:r>
+            <a:r>
+              <a:rPr lang="en-US" dirty="0" smtClean="0"/>
+              <a:t>Jack Flowers</a:t>
+            </a:r>
+            <a:endParaRPr lang="en-US" dirty="0"/>
+          </a:p>
+        </p:txBody>
+      </p:sp>
+    </p:spTree>
+    <p:extLst>
+      <p:ext uri="{BB962C8B-B14F-4D97-AF65-F5344CB8AC3E}">
+        <p14:creationId xmlns:p14="http://schemas.microsoft.com/office/powerpoint/2010/main" val="2362297389"/>
+      </p:ext>
+    </p:extLst>
+  </p:cSld>
+  <p:clrMapOvr>
+    <a:masterClrMapping/>
+  </p:clrMapOvr>
+</p:sld>
+</file>
+
+<file path=ppt/slides/slide12.xml><?xml version="1.0" encoding="utf-8"?>
+<p:sld xmlns:a="http://schemas.openxmlformats.org/drawingml/2006/main" xmlns:r="http://schemas.openxmlformats.org/officeDocument/2006/relationships" xmlns:p="http://schemas.openxmlformats.org/presentationml/2006/main">
+  <p:cSld>
+    <p:spTree>
+      <p:nvGrpSpPr>
+        <p:cNvPr id="1" name=""/>
+        <p:cNvGrpSpPr/>
+        <p:nvPr/>
+      </p:nvGrpSpPr>
+      <p:grpSpPr>
+        <a:xfrm>
+          <a:off x="0" y="0"/>
+          <a:ext cx="0" cy="0"/>
+          <a:chOff x="0" y="0"/>
+          <a:chExt cx="0" cy="0"/>
+        </a:xfrm>
+      </p:grpSpPr>
+      <p:sp>
+        <p:nvSpPr>
+          <p:cNvPr id="2" name="Title 1"/>
+          <p:cNvSpPr>
+            <a:spLocks noGrp="1"/>
+          </p:cNvSpPr>
+          <p:nvPr>
+            <p:ph type="title"/>
+          </p:nvPr>
+        </p:nvSpPr>
+        <p:spPr/>
+        <p:txBody>
+          <a:bodyPr/>
+          <a:lstStyle/>
+          <a:p>
+            <a:pPr algn="ctr"/>
+            <a:r>
+              <a:rPr lang="en-US" dirty="0" smtClean="0"/>
+              <a:t>Questions</a:t>
+            </a:r>
+            <a:endParaRPr lang="en-US" dirty="0"/>
+          </a:p>
+        </p:txBody>
+      </p:sp>
+      <p:pic>
+        <p:nvPicPr>
+          <p:cNvPr id="4" name="Content Placeholder 3"/>
+          <p:cNvPicPr>
+            <a:picLocks noGrp="1" noChangeAspect="1"/>
+          </p:cNvPicPr>
+          <p:nvPr>
+            <p:ph idx="1"/>
+          </p:nvPr>
+        </p:nvPicPr>
+        <p:blipFill>
+          <a:blip r:embed="rId2">
+            <a:extLst>
+              <a:ext uri="{28A0092B-C50C-407E-A947-70E740481C1C}">
+                <a14:useLocalDpi xmlns:a14="http://schemas.microsoft.com/office/drawing/2010/main" val="0"/>
+              </a:ext>
+            </a:extLst>
+          </a:blip>
+          <a:stretch>
+            <a:fillRect/>
+          </a:stretch>
+        </p:blipFill>
+        <p:spPr>
+          <a:xfrm>
+            <a:off x="838200" y="1690688"/>
+            <a:ext cx="6353284" cy="4351338"/>
+          </a:xfrm>
+        </p:spPr>
+      </p:pic>
+      <p:sp>
+        <p:nvSpPr>
+          <p:cNvPr id="5" name="TextBox 4"/>
+          <p:cNvSpPr txBox="1"/>
+          <p:nvPr/>
+        </p:nvSpPr>
+        <p:spPr>
+          <a:xfrm>
+            <a:off x="8177349" y="1690688"/>
+            <a:ext cx="3176451" cy="4524315"/>
+          </a:xfrm>
+          <a:prstGeom prst="rect">
+            <a:avLst/>
+          </a:prstGeom>
+          <a:noFill/>
+        </p:spPr>
+        <p:txBody>
+          <a:bodyPr wrap="square" rtlCol="0">
+            <a:spAutoFit/>
+          </a:bodyPr>
+          <a:lstStyle/>
+          <a:p>
+            <a:pPr marL="285750" indent="-285750">
+              <a:buFont typeface="Arial" panose="020B0604020202020204" pitchFamily="34" charset="0"/>
+              <a:buChar char="•"/>
+            </a:pPr>
+            <a:r>
+              <a:rPr lang="en-US" dirty="0" smtClean="0"/>
+              <a:t>Tasks</a:t>
+            </a:r>
+          </a:p>
+          <a:p>
+            <a:pPr marL="742950" lvl="1" indent="-285750">
+              <a:buFont typeface="Arial" panose="020B0604020202020204" pitchFamily="34" charset="0"/>
+              <a:buChar char="•"/>
+            </a:pPr>
+            <a:r>
+              <a:rPr lang="en-US" dirty="0" smtClean="0"/>
+              <a:t>Logging in</a:t>
+            </a:r>
+          </a:p>
+          <a:p>
+            <a:pPr marL="742950" lvl="1" indent="-285750">
+              <a:buFont typeface="Arial" panose="020B0604020202020204" pitchFamily="34" charset="0"/>
+              <a:buChar char="•"/>
+            </a:pPr>
+            <a:r>
+              <a:rPr lang="en-US" dirty="0" smtClean="0"/>
+              <a:t>Searching</a:t>
+            </a:r>
+          </a:p>
+          <a:p>
+            <a:pPr marL="742950" lvl="1" indent="-285750">
+              <a:buFont typeface="Arial" panose="020B0604020202020204" pitchFamily="34" charset="0"/>
+              <a:buChar char="•"/>
+            </a:pPr>
+            <a:r>
+              <a:rPr lang="en-US" dirty="0" smtClean="0"/>
+              <a:t>Look up trending items</a:t>
+            </a:r>
+          </a:p>
+          <a:p>
+            <a:pPr marL="742950" lvl="1" indent="-285750">
+              <a:buFont typeface="Arial" panose="020B0604020202020204" pitchFamily="34" charset="0"/>
+              <a:buChar char="•"/>
+            </a:pPr>
+            <a:r>
+              <a:rPr lang="en-US" dirty="0" smtClean="0"/>
+              <a:t>View favorites</a:t>
+            </a:r>
+          </a:p>
+          <a:p>
+            <a:pPr marL="742950" lvl="1" indent="-285750">
+              <a:buFont typeface="Arial" panose="020B0604020202020204" pitchFamily="34" charset="0"/>
+              <a:buChar char="•"/>
+            </a:pPr>
+            <a:r>
+              <a:rPr lang="en-US" dirty="0" smtClean="0"/>
+              <a:t>Look up a sports team</a:t>
+            </a:r>
+          </a:p>
+          <a:p>
+            <a:pPr marL="742950" lvl="1" indent="-285750">
+              <a:buFont typeface="Arial" panose="020B0604020202020204" pitchFamily="34" charset="0"/>
+              <a:buChar char="•"/>
+            </a:pPr>
+            <a:r>
+              <a:rPr lang="en-US" dirty="0" smtClean="0"/>
+              <a:t>See theater show times</a:t>
+            </a:r>
+          </a:p>
+          <a:p>
+            <a:pPr lvl="1"/>
+            <a:endParaRPr lang="en-US" dirty="0" smtClean="0"/>
+          </a:p>
+          <a:p>
+            <a:pPr marL="285750" indent="-285750">
+              <a:buFont typeface="Arial" panose="020B0604020202020204" pitchFamily="34" charset="0"/>
+              <a:buChar char="•"/>
+            </a:pPr>
+            <a:r>
+              <a:rPr lang="en-US" dirty="0" smtClean="0"/>
+              <a:t>Questions</a:t>
+            </a:r>
+          </a:p>
+          <a:p>
+            <a:pPr marL="742950" lvl="1" indent="-285750">
+              <a:buFont typeface="Arial" panose="020B0604020202020204" pitchFamily="34" charset="0"/>
+              <a:buChar char="•"/>
+            </a:pPr>
+            <a:r>
+              <a:rPr lang="en-US" dirty="0" smtClean="0"/>
+              <a:t>Task follow-ups</a:t>
+            </a:r>
+          </a:p>
+          <a:p>
+            <a:pPr marL="742950" lvl="1" indent="-285750">
+              <a:buFont typeface="Arial" panose="020B0604020202020204" pitchFamily="34" charset="0"/>
+              <a:buChar char="•"/>
+            </a:pPr>
+            <a:r>
+              <a:rPr lang="en-US" dirty="0" smtClean="0"/>
+              <a:t>Colors</a:t>
+            </a:r>
+          </a:p>
+          <a:p>
+            <a:pPr marL="742950" lvl="1" indent="-285750">
+              <a:buFont typeface="Arial" panose="020B0604020202020204" pitchFamily="34" charset="0"/>
+              <a:buChar char="•"/>
+            </a:pPr>
+            <a:r>
+              <a:rPr lang="en-US" dirty="0" smtClean="0"/>
+              <a:t>Layout</a:t>
+            </a:r>
+          </a:p>
+          <a:p>
+            <a:pPr lvl="1"/>
+            <a:endParaRPr lang="en-US" dirty="0" smtClean="0"/>
+          </a:p>
+          <a:p>
+            <a:pPr marL="285750" indent="-285750">
+              <a:buFont typeface="Arial" panose="020B0604020202020204" pitchFamily="34" charset="0"/>
+              <a:buChar char="•"/>
+            </a:pPr>
+            <a:r>
+              <a:rPr lang="en-US" dirty="0" smtClean="0"/>
+              <a:t>Easy to navigate</a:t>
+            </a:r>
+          </a:p>
+          <a:p>
+            <a:pPr marL="742950" lvl="1" indent="-285750">
+              <a:buFont typeface="Arial" panose="020B0604020202020204" pitchFamily="34" charset="0"/>
+              <a:buChar char="•"/>
+            </a:pPr>
+            <a:endParaRPr lang="en-US" dirty="0" smtClean="0"/>
+          </a:p>
+          <a:p>
+            <a:pPr marL="285750" indent="-285750">
+              <a:buFont typeface="Arial" panose="020B0604020202020204" pitchFamily="34" charset="0"/>
+              <a:buChar char="•"/>
+            </a:pPr>
+            <a:endParaRPr lang="en-US" dirty="0"/>
+          </a:p>
+        </p:txBody>
+      </p:sp>
+      <p:sp>
+        <p:nvSpPr>
+          <p:cNvPr id="6" name="TextBox 5"/>
+          <p:cNvSpPr txBox="1"/>
+          <p:nvPr/>
+        </p:nvSpPr>
+        <p:spPr>
+          <a:xfrm>
+            <a:off x="838200" y="6363222"/>
+            <a:ext cx="1591358" cy="369332"/>
+          </a:xfrm>
+          <a:prstGeom prst="rect">
+            <a:avLst/>
+          </a:prstGeom>
+          <a:noFill/>
+        </p:spPr>
+        <p:txBody>
+          <a:bodyPr wrap="square" rtlCol="0">
+            <a:spAutoFit/>
+          </a:bodyPr>
+          <a:lstStyle/>
+          <a:p>
+            <a:r>
+              <a:rPr lang="en-US" dirty="0" smtClean="0"/>
+              <a:t>Team Octopus</a:t>
+            </a:r>
+            <a:endParaRPr lang="en-US" dirty="0"/>
+          </a:p>
+        </p:txBody>
+      </p:sp>
+      <p:sp>
+        <p:nvSpPr>
+          <p:cNvPr id="7" name="TextBox 6"/>
+          <p:cNvSpPr txBox="1"/>
+          <p:nvPr/>
+        </p:nvSpPr>
+        <p:spPr>
+          <a:xfrm>
+            <a:off x="4729586" y="6363222"/>
+            <a:ext cx="2732827" cy="369332"/>
+          </a:xfrm>
+          <a:prstGeom prst="rect">
+            <a:avLst/>
+          </a:prstGeom>
+          <a:noFill/>
+        </p:spPr>
+        <p:txBody>
+          <a:bodyPr wrap="square" rtlCol="0">
+            <a:spAutoFit/>
+          </a:bodyPr>
+          <a:lstStyle/>
+          <a:p>
+            <a:r>
+              <a:rPr lang="en-US" dirty="0" smtClean="0"/>
+              <a:t>High</a:t>
+            </a:r>
+            <a:r>
+              <a:rPr lang="en-US" dirty="0" smtClean="0"/>
+              <a:t>-Fidelity </a:t>
+            </a:r>
+            <a:r>
+              <a:rPr lang="en-US" dirty="0" smtClean="0"/>
+              <a:t>Prototype</a:t>
+            </a:r>
+            <a:endParaRPr lang="en-US" dirty="0"/>
+          </a:p>
+        </p:txBody>
+      </p:sp>
+      <p:sp>
+        <p:nvSpPr>
+          <p:cNvPr id="8" name="TextBox 7"/>
+          <p:cNvSpPr txBox="1"/>
+          <p:nvPr/>
+        </p:nvSpPr>
+        <p:spPr>
+          <a:xfrm>
+            <a:off x="8415555" y="6363222"/>
+            <a:ext cx="3062341" cy="369332"/>
+          </a:xfrm>
+          <a:prstGeom prst="rect">
+            <a:avLst/>
+          </a:prstGeom>
+          <a:noFill/>
+        </p:spPr>
+        <p:txBody>
+          <a:bodyPr wrap="square" rtlCol="0">
+            <a:spAutoFit/>
+          </a:bodyPr>
+          <a:lstStyle/>
+          <a:p>
+            <a:r>
+              <a:rPr lang="en-US" dirty="0" smtClean="0"/>
+              <a:t>Team Member: </a:t>
+            </a:r>
+            <a:r>
+              <a:rPr lang="en-US" dirty="0" smtClean="0"/>
+              <a:t>Jack Flowers</a:t>
+            </a:r>
+            <a:endParaRPr lang="en-US" dirty="0"/>
+          </a:p>
+        </p:txBody>
+      </p:sp>
+    </p:spTree>
+    <p:extLst>
+      <p:ext uri="{BB962C8B-B14F-4D97-AF65-F5344CB8AC3E}">
+        <p14:creationId xmlns:p14="http://schemas.microsoft.com/office/powerpoint/2010/main" val="287851209"/>
+      </p:ext>
+    </p:extLst>
+  </p:cSld>
+  <p:clrMapOvr>
+    <a:masterClrMapping/>
+  </p:clrMapOvr>
+</p:sld>
+</file>
+
+<file path=ppt/slides/slide13.xml><?xml version="1.0" encoding="utf-8"?>
+<p:sld xmlns:a="http://schemas.openxmlformats.org/drawingml/2006/main" xmlns:r="http://schemas.openxmlformats.org/officeDocument/2006/relationships" xmlns:p="http://schemas.openxmlformats.org/presentationml/2006/main">
+  <p:cSld>
+    <p:spTree>
+      <p:nvGrpSpPr>
+        <p:cNvPr id="1" name=""/>
+        <p:cNvGrpSpPr/>
+        <p:nvPr/>
+      </p:nvGrpSpPr>
+      <p:grpSpPr>
+        <a:xfrm>
+          <a:off x="0" y="0"/>
+          <a:ext cx="0" cy="0"/>
+          <a:chOff x="0" y="0"/>
+          <a:chExt cx="0" cy="0"/>
+        </a:xfrm>
+      </p:grpSpPr>
+      <p:sp>
+        <p:nvSpPr>
+          <p:cNvPr id="2" name="Title 1"/>
+          <p:cNvSpPr>
+            <a:spLocks noGrp="1"/>
+          </p:cNvSpPr>
+          <p:nvPr>
+            <p:ph type="title"/>
+          </p:nvPr>
+        </p:nvSpPr>
+        <p:spPr/>
+        <p:txBody>
+          <a:bodyPr/>
+          <a:lstStyle/>
+          <a:p>
+            <a:pPr algn="ctr"/>
+            <a:r>
+              <a:rPr lang="en-US" dirty="0" smtClean="0"/>
+              <a:t>Improvements</a:t>
+            </a:r>
+            <a:endParaRPr lang="en-US" dirty="0"/>
+          </a:p>
+        </p:txBody>
+      </p:sp>
+      <p:sp>
+        <p:nvSpPr>
+          <p:cNvPr id="6" name="TextBox 5"/>
+          <p:cNvSpPr txBox="1"/>
+          <p:nvPr/>
+        </p:nvSpPr>
+        <p:spPr>
+          <a:xfrm>
+            <a:off x="8177349" y="1690688"/>
+            <a:ext cx="3176451" cy="3416320"/>
+          </a:xfrm>
+          <a:prstGeom prst="rect">
+            <a:avLst/>
+          </a:prstGeom>
+          <a:noFill/>
+        </p:spPr>
+        <p:txBody>
+          <a:bodyPr wrap="square" rtlCol="0">
+            <a:spAutoFit/>
+          </a:bodyPr>
+          <a:lstStyle/>
+          <a:p>
+            <a:pPr marL="285750" indent="-285750">
+              <a:buFont typeface="Arial" panose="020B0604020202020204" pitchFamily="34" charset="0"/>
+              <a:buChar char="•"/>
+            </a:pPr>
+            <a:r>
+              <a:rPr lang="en-US" dirty="0" smtClean="0"/>
+              <a:t>Improvements</a:t>
+            </a:r>
+          </a:p>
+          <a:p>
+            <a:endParaRPr lang="en-US" dirty="0"/>
+          </a:p>
+          <a:p>
+            <a:pPr marL="742950" lvl="1" indent="-285750">
+              <a:buFont typeface="Arial" panose="020B0604020202020204" pitchFamily="34" charset="0"/>
+              <a:buChar char="•"/>
+            </a:pPr>
+            <a:r>
+              <a:rPr lang="en-US" dirty="0"/>
+              <a:t>Color Scheme</a:t>
+            </a:r>
+          </a:p>
+          <a:p>
+            <a:pPr marL="1200150" lvl="2" indent="-285750">
+              <a:buFont typeface="Arial" panose="020B0604020202020204" pitchFamily="34" charset="0"/>
+              <a:buChar char="•"/>
+            </a:pPr>
+            <a:r>
+              <a:rPr lang="en-US" dirty="0"/>
+              <a:t>Background</a:t>
+            </a:r>
+          </a:p>
+          <a:p>
+            <a:pPr marL="1200150" lvl="2" indent="-285750">
+              <a:buFont typeface="Arial" panose="020B0604020202020204" pitchFamily="34" charset="0"/>
+              <a:buChar char="•"/>
+            </a:pPr>
+            <a:r>
+              <a:rPr lang="en-US" dirty="0" smtClean="0"/>
+              <a:t>Tables</a:t>
+            </a:r>
+          </a:p>
+          <a:p>
+            <a:pPr lvl="2"/>
+            <a:endParaRPr lang="en-US" dirty="0" smtClean="0"/>
+          </a:p>
+          <a:p>
+            <a:pPr marL="742950" lvl="1" indent="-285750">
+              <a:buFont typeface="Arial" panose="020B0604020202020204" pitchFamily="34" charset="0"/>
+              <a:buChar char="•"/>
+            </a:pPr>
+            <a:r>
+              <a:rPr lang="en-US" dirty="0" smtClean="0"/>
+              <a:t>Page layouts</a:t>
+            </a:r>
+          </a:p>
+          <a:p>
+            <a:pPr marL="1200150" lvl="2" indent="-285750">
+              <a:buFont typeface="Arial" panose="020B0604020202020204" pitchFamily="34" charset="0"/>
+              <a:buChar char="•"/>
+            </a:pPr>
+            <a:r>
+              <a:rPr lang="en-US" dirty="0" smtClean="0"/>
+              <a:t>Sports page</a:t>
+            </a:r>
+          </a:p>
+          <a:p>
+            <a:pPr marL="1200150" lvl="2" indent="-285750">
+              <a:buFont typeface="Arial" panose="020B0604020202020204" pitchFamily="34" charset="0"/>
+              <a:buChar char="•"/>
+            </a:pPr>
+            <a:r>
+              <a:rPr lang="en-US" dirty="0" smtClean="0"/>
+              <a:t>Home page</a:t>
+            </a:r>
+          </a:p>
+          <a:p>
+            <a:pPr marL="1200150" lvl="2" indent="-285750">
+              <a:buFont typeface="Arial" panose="020B0604020202020204" pitchFamily="34" charset="0"/>
+              <a:buChar char="•"/>
+            </a:pPr>
+            <a:r>
+              <a:rPr lang="en-US" dirty="0"/>
+              <a:t>Info </a:t>
+            </a:r>
+            <a:r>
+              <a:rPr lang="en-US" dirty="0" smtClean="0"/>
+              <a:t>page</a:t>
+            </a:r>
+          </a:p>
+          <a:p>
+            <a:pPr marL="742950" lvl="1" indent="-285750">
+              <a:buFont typeface="Arial" panose="020B0604020202020204" pitchFamily="34" charset="0"/>
+              <a:buChar char="•"/>
+            </a:pPr>
+            <a:endParaRPr lang="en-US" dirty="0" smtClean="0"/>
+          </a:p>
+          <a:p>
+            <a:pPr marL="285750" indent="-285750">
+              <a:buFont typeface="Arial" panose="020B0604020202020204" pitchFamily="34" charset="0"/>
+              <a:buChar char="•"/>
+            </a:pPr>
+            <a:endParaRPr lang="en-US" dirty="0"/>
+          </a:p>
+        </p:txBody>
+      </p:sp>
+      <p:pic>
+        <p:nvPicPr>
+          <p:cNvPr id="13" name="Content Placeholder 12"/>
+          <p:cNvPicPr>
+            <a:picLocks noGrp="1" noChangeAspect="1"/>
+          </p:cNvPicPr>
+          <p:nvPr>
+            <p:ph idx="1"/>
+          </p:nvPr>
+        </p:nvPicPr>
+        <p:blipFill>
+          <a:blip r:embed="rId2">
+            <a:extLst>
+              <a:ext uri="{28A0092B-C50C-407E-A947-70E740481C1C}">
+                <a14:useLocalDpi xmlns:a14="http://schemas.microsoft.com/office/drawing/2010/main" val="0"/>
+              </a:ext>
+            </a:extLst>
+          </a:blip>
+          <a:stretch>
+            <a:fillRect/>
+          </a:stretch>
+        </p:blipFill>
+        <p:spPr>
+          <a:xfrm>
+            <a:off x="838200" y="1690688"/>
+            <a:ext cx="6093777" cy="4351338"/>
+          </a:xfrm>
+        </p:spPr>
+      </p:pic>
+      <p:sp>
+        <p:nvSpPr>
+          <p:cNvPr id="14" name="TextBox 13"/>
+          <p:cNvSpPr txBox="1"/>
+          <p:nvPr/>
+        </p:nvSpPr>
+        <p:spPr>
+          <a:xfrm>
+            <a:off x="838200" y="6363222"/>
+            <a:ext cx="1591358" cy="369332"/>
+          </a:xfrm>
+          <a:prstGeom prst="rect">
+            <a:avLst/>
+          </a:prstGeom>
+          <a:noFill/>
+        </p:spPr>
+        <p:txBody>
+          <a:bodyPr wrap="square" rtlCol="0">
+            <a:spAutoFit/>
+          </a:bodyPr>
+          <a:lstStyle/>
+          <a:p>
+            <a:r>
+              <a:rPr lang="en-US" dirty="0" smtClean="0"/>
+              <a:t>Team Octopus</a:t>
+            </a:r>
+            <a:endParaRPr lang="en-US" dirty="0"/>
+          </a:p>
+        </p:txBody>
+      </p:sp>
+      <p:sp>
+        <p:nvSpPr>
+          <p:cNvPr id="16" name="TextBox 15"/>
+          <p:cNvSpPr txBox="1"/>
+          <p:nvPr/>
+        </p:nvSpPr>
+        <p:spPr>
+          <a:xfrm>
+            <a:off x="4729586" y="6363222"/>
+            <a:ext cx="2732827" cy="369332"/>
+          </a:xfrm>
+          <a:prstGeom prst="rect">
+            <a:avLst/>
+          </a:prstGeom>
+          <a:noFill/>
+        </p:spPr>
+        <p:txBody>
+          <a:bodyPr wrap="square" rtlCol="0">
+            <a:spAutoFit/>
+          </a:bodyPr>
+          <a:lstStyle/>
+          <a:p>
+            <a:r>
+              <a:rPr lang="en-US" dirty="0" smtClean="0"/>
+              <a:t>High</a:t>
+            </a:r>
+            <a:r>
+              <a:rPr lang="en-US" dirty="0" smtClean="0"/>
+              <a:t>-Fidelity </a:t>
+            </a:r>
+            <a:r>
+              <a:rPr lang="en-US" dirty="0" smtClean="0"/>
+              <a:t>Prototype</a:t>
+            </a:r>
+            <a:endParaRPr lang="en-US" dirty="0"/>
+          </a:p>
+        </p:txBody>
+      </p:sp>
+      <p:sp>
+        <p:nvSpPr>
+          <p:cNvPr id="17" name="TextBox 16"/>
+          <p:cNvSpPr txBox="1"/>
+          <p:nvPr/>
+        </p:nvSpPr>
+        <p:spPr>
+          <a:xfrm>
+            <a:off x="8415555" y="6363222"/>
+            <a:ext cx="3062341" cy="369332"/>
+          </a:xfrm>
+          <a:prstGeom prst="rect">
+            <a:avLst/>
+          </a:prstGeom>
+          <a:noFill/>
+        </p:spPr>
+        <p:txBody>
+          <a:bodyPr wrap="square" rtlCol="0">
+            <a:spAutoFit/>
+          </a:bodyPr>
+          <a:lstStyle/>
+          <a:p>
+            <a:r>
+              <a:rPr lang="en-US" dirty="0" smtClean="0"/>
+              <a:t>Team Member: </a:t>
+            </a:r>
+            <a:r>
+              <a:rPr lang="en-US" dirty="0" smtClean="0"/>
+              <a:t>Jack Flowers</a:t>
+            </a:r>
+            <a:endParaRPr lang="en-US" dirty="0"/>
+          </a:p>
+        </p:txBody>
+      </p:sp>
+    </p:spTree>
+    <p:extLst>
+      <p:ext uri="{BB962C8B-B14F-4D97-AF65-F5344CB8AC3E}">
+        <p14:creationId xmlns:p14="http://schemas.microsoft.com/office/powerpoint/2010/main" val="2559821288"/>
+      </p:ext>
+    </p:extLst>
+  </p:cSld>
+  <p:clrMapOvr>
+    <a:masterClrMapping/>
+  </p:clrMapOvr>
+</p:sld>
+</file>
+
+<file path=ppt/slides/slide14.xml><?xml version="1.0" encoding="utf-8"?>
+<p:sld xmlns:a="http://schemas.openxmlformats.org/drawingml/2006/main" xmlns:r="http://schemas.openxmlformats.org/officeDocument/2006/relationships" xmlns:p="http://schemas.openxmlformats.org/presentationml/2006/main">
+  <p:cSld>
+    <p:spTree>
+      <p:nvGrpSpPr>
+        <p:cNvPr id="1" name=""/>
+        <p:cNvGrpSpPr/>
+        <p:nvPr/>
+      </p:nvGrpSpPr>
+      <p:grpSpPr>
+        <a:xfrm>
+          <a:off x="0" y="0"/>
+          <a:ext cx="0" cy="0"/>
+          <a:chOff x="0" y="0"/>
+          <a:chExt cx="0" cy="0"/>
+        </a:xfrm>
+      </p:grpSpPr>
+      <p:sp>
+        <p:nvSpPr>
+          <p:cNvPr id="2" name="Title 1"/>
+          <p:cNvSpPr>
+            <a:spLocks noGrp="1"/>
+          </p:cNvSpPr>
+          <p:nvPr>
+            <p:ph type="title"/>
+          </p:nvPr>
+        </p:nvSpPr>
+        <p:spPr/>
+        <p:txBody>
+          <a:bodyPr/>
+          <a:lstStyle/>
+          <a:p>
+            <a:pPr algn="ctr"/>
+            <a:r>
+              <a:rPr lang="en-US" dirty="0" smtClean="0"/>
+              <a:t>Info Page</a:t>
+            </a:r>
+            <a:endParaRPr lang="en-US" dirty="0"/>
+          </a:p>
+        </p:txBody>
+      </p:sp>
+      <p:pic>
+        <p:nvPicPr>
+          <p:cNvPr id="4" name="Content Placeholder 3"/>
+          <p:cNvPicPr>
+            <a:picLocks noGrp="1" noChangeAspect="1"/>
+          </p:cNvPicPr>
+          <p:nvPr>
+            <p:ph idx="1"/>
+          </p:nvPr>
+        </p:nvPicPr>
+        <p:blipFill>
+          <a:blip r:embed="rId2">
+            <a:extLst>
+              <a:ext uri="{28A0092B-C50C-407E-A947-70E740481C1C}">
+                <a14:useLocalDpi xmlns:a14="http://schemas.microsoft.com/office/drawing/2010/main" val="0"/>
+              </a:ext>
+            </a:extLst>
+          </a:blip>
+          <a:stretch>
+            <a:fillRect/>
+          </a:stretch>
+        </p:blipFill>
+        <p:spPr>
+          <a:xfrm>
+            <a:off x="2717074" y="1825625"/>
+            <a:ext cx="6130836" cy="4351338"/>
+          </a:xfrm>
+        </p:spPr>
+      </p:pic>
+      <p:sp>
+        <p:nvSpPr>
+          <p:cNvPr id="5" name="TextBox 4"/>
+          <p:cNvSpPr txBox="1"/>
+          <p:nvPr/>
+        </p:nvSpPr>
+        <p:spPr>
+          <a:xfrm>
+            <a:off x="838200" y="6363222"/>
+            <a:ext cx="1591358" cy="369332"/>
+          </a:xfrm>
+          <a:prstGeom prst="rect">
+            <a:avLst/>
+          </a:prstGeom>
+          <a:noFill/>
+        </p:spPr>
+        <p:txBody>
+          <a:bodyPr wrap="square" rtlCol="0">
+            <a:spAutoFit/>
+          </a:bodyPr>
+          <a:lstStyle/>
+          <a:p>
+            <a:r>
+              <a:rPr lang="en-US" dirty="0" smtClean="0"/>
+              <a:t>Team Octopus</a:t>
+            </a:r>
+            <a:endParaRPr lang="en-US" dirty="0"/>
+          </a:p>
+        </p:txBody>
+      </p:sp>
+      <p:sp>
+        <p:nvSpPr>
+          <p:cNvPr id="6" name="TextBox 5"/>
+          <p:cNvSpPr txBox="1"/>
+          <p:nvPr/>
+        </p:nvSpPr>
+        <p:spPr>
+          <a:xfrm>
+            <a:off x="4729586" y="6363222"/>
+            <a:ext cx="2732827" cy="369332"/>
+          </a:xfrm>
+          <a:prstGeom prst="rect">
+            <a:avLst/>
+          </a:prstGeom>
+          <a:noFill/>
+        </p:spPr>
+        <p:txBody>
+          <a:bodyPr wrap="square" rtlCol="0">
+            <a:spAutoFit/>
+          </a:bodyPr>
+          <a:lstStyle/>
+          <a:p>
+            <a:r>
+              <a:rPr lang="en-US" dirty="0" smtClean="0"/>
+              <a:t>High</a:t>
+            </a:r>
+            <a:r>
+              <a:rPr lang="en-US" dirty="0" smtClean="0"/>
+              <a:t>-Fidelity </a:t>
+            </a:r>
+            <a:r>
+              <a:rPr lang="en-US" dirty="0" smtClean="0"/>
+              <a:t>Prototype</a:t>
+            </a:r>
+            <a:endParaRPr lang="en-US" dirty="0"/>
+          </a:p>
+        </p:txBody>
+      </p:sp>
+      <p:sp>
+        <p:nvSpPr>
+          <p:cNvPr id="7" name="TextBox 6"/>
+          <p:cNvSpPr txBox="1"/>
+          <p:nvPr/>
+        </p:nvSpPr>
+        <p:spPr>
+          <a:xfrm>
+            <a:off x="8415555" y="6363222"/>
+            <a:ext cx="3062341" cy="369332"/>
+          </a:xfrm>
+          <a:prstGeom prst="rect">
+            <a:avLst/>
+          </a:prstGeom>
+          <a:noFill/>
+        </p:spPr>
+        <p:txBody>
+          <a:bodyPr wrap="square" rtlCol="0">
+            <a:spAutoFit/>
+          </a:bodyPr>
+          <a:lstStyle/>
+          <a:p>
+            <a:r>
+              <a:rPr lang="en-US" dirty="0" smtClean="0"/>
+              <a:t>Team Member: </a:t>
+            </a:r>
+            <a:r>
+              <a:rPr lang="en-US" dirty="0" smtClean="0"/>
+              <a:t>Jack Flowers</a:t>
+            </a:r>
+            <a:endParaRPr lang="en-US" dirty="0"/>
+          </a:p>
+        </p:txBody>
+      </p:sp>
+    </p:spTree>
+    <p:extLst>
+      <p:ext uri="{BB962C8B-B14F-4D97-AF65-F5344CB8AC3E}">
+        <p14:creationId xmlns:p14="http://schemas.microsoft.com/office/powerpoint/2010/main" val="532445137"/>
+      </p:ext>
+    </p:extLst>
+  </p:cSld>
+  <p:clrMapOvr>
+    <a:masterClrMapping/>
+  </p:clrMapOvr>
+</p:sld>
+</file>
+
 <file path=ppt/slides/slide2.xml><?xml version="1.0" encoding="utf-8"?>
 <p:sld xmlns:a="http://schemas.openxmlformats.org/drawingml/2006/main" xmlns:r="http://schemas.openxmlformats.org/officeDocument/2006/relationships" xmlns:p="http://schemas.openxmlformats.org/presentationml/2006/main">
   <p:cSld>
@@ -4164,7 +5360,7 @@
           <a:lstStyle/>
           <a:p>
             <a:r>
-              <a:rPr lang="en-US" smtClean="0"/>
+              <a:rPr lang="en-US" dirty="0" smtClean="0"/>
               <a:t>Low-Fidelity Prototype</a:t>
             </a:r>
             <a:endParaRPr lang="en-US" dirty="0"/>
@@ -4194,10 +5390,10 @@
           <a:lstStyle/>
           <a:p>
             <a:r>
-              <a:rPr lang="en-US" smtClean="0"/>
+              <a:rPr lang="en-US" dirty="0" smtClean="0"/>
               <a:t>Team Member: Alex Will</a:t>
             </a:r>
-            <a:endParaRPr lang="en-US"/>
+            <a:endParaRPr lang="en-US" dirty="0"/>
           </a:p>
         </p:txBody>
       </p:sp>
@@ -4205,6 +5401,674 @@
     <p:extLst>
       <p:ext uri="{BB962C8B-B14F-4D97-AF65-F5344CB8AC3E}">
         <p14:creationId xmlns:p14="http://schemas.microsoft.com/office/powerpoint/2010/main" val="209706283"/>
+      </p:ext>
+    </p:extLst>
+  </p:cSld>
+  <p:clrMapOvr>
+    <a:masterClrMapping/>
+  </p:clrMapOvr>
+</p:sld>
+</file>
+
+<file path=ppt/slides/slide6.xml><?xml version="1.0" encoding="utf-8"?>
+<p:sld xmlns:a="http://schemas.openxmlformats.org/drawingml/2006/main" xmlns:r="http://schemas.openxmlformats.org/officeDocument/2006/relationships" xmlns:p="http://schemas.openxmlformats.org/presentationml/2006/main">
+  <p:cSld>
+    <p:spTree>
+      <p:nvGrpSpPr>
+        <p:cNvPr id="1" name=""/>
+        <p:cNvGrpSpPr/>
+        <p:nvPr/>
+      </p:nvGrpSpPr>
+      <p:grpSpPr>
+        <a:xfrm>
+          <a:off x="0" y="0"/>
+          <a:ext cx="0" cy="0"/>
+          <a:chOff x="0" y="0"/>
+          <a:chExt cx="0" cy="0"/>
+        </a:xfrm>
+      </p:grpSpPr>
+      <p:sp>
+        <p:nvSpPr>
+          <p:cNvPr id="2" name="Title 1"/>
+          <p:cNvSpPr>
+            <a:spLocks noGrp="1"/>
+          </p:cNvSpPr>
+          <p:nvPr>
+            <p:ph type="title"/>
+          </p:nvPr>
+        </p:nvSpPr>
+        <p:spPr/>
+        <p:txBody>
+          <a:bodyPr/>
+          <a:lstStyle/>
+          <a:p>
+            <a:pPr algn="ctr"/>
+            <a:r>
+              <a:rPr lang="en-US" dirty="0" smtClean="0"/>
+              <a:t>Affinity Diagram</a:t>
+            </a:r>
+            <a:endParaRPr lang="en-US" dirty="0"/>
+          </a:p>
+        </p:txBody>
+      </p:sp>
+      <p:sp>
+        <p:nvSpPr>
+          <p:cNvPr id="3" name="Content Placeholder 2"/>
+          <p:cNvSpPr>
+            <a:spLocks noGrp="1"/>
+          </p:cNvSpPr>
+          <p:nvPr>
+            <p:ph idx="1"/>
+          </p:nvPr>
+        </p:nvSpPr>
+        <p:spPr/>
+        <p:txBody>
+          <a:bodyPr/>
+          <a:lstStyle/>
+          <a:p>
+            <a:endParaRPr lang="en-US" dirty="0"/>
+          </a:p>
+        </p:txBody>
+      </p:sp>
+      <p:sp>
+        <p:nvSpPr>
+          <p:cNvPr id="4" name="TextBox 3"/>
+          <p:cNvSpPr txBox="1"/>
+          <p:nvPr/>
+        </p:nvSpPr>
+        <p:spPr>
+          <a:xfrm>
+            <a:off x="838200" y="6363222"/>
+            <a:ext cx="1591358" cy="369332"/>
+          </a:xfrm>
+          <a:prstGeom prst="rect">
+            <a:avLst/>
+          </a:prstGeom>
+          <a:noFill/>
+        </p:spPr>
+        <p:txBody>
+          <a:bodyPr wrap="square" rtlCol="0">
+            <a:spAutoFit/>
+          </a:bodyPr>
+          <a:lstStyle/>
+          <a:p>
+            <a:r>
+              <a:rPr lang="en-US" dirty="0" smtClean="0"/>
+              <a:t>Team Octopus</a:t>
+            </a:r>
+            <a:endParaRPr lang="en-US" dirty="0"/>
+          </a:p>
+        </p:txBody>
+      </p:sp>
+      <p:sp>
+        <p:nvSpPr>
+          <p:cNvPr id="5" name="TextBox 4"/>
+          <p:cNvSpPr txBox="1"/>
+          <p:nvPr/>
+        </p:nvSpPr>
+        <p:spPr>
+          <a:xfrm>
+            <a:off x="4385181" y="6363222"/>
+            <a:ext cx="3421637" cy="369332"/>
+          </a:xfrm>
+          <a:prstGeom prst="rect">
+            <a:avLst/>
+          </a:prstGeom>
+          <a:noFill/>
+        </p:spPr>
+        <p:txBody>
+          <a:bodyPr wrap="square" rtlCol="0">
+            <a:spAutoFit/>
+          </a:bodyPr>
+          <a:lstStyle/>
+          <a:p>
+            <a:r>
+              <a:rPr lang="en-US" dirty="0" smtClean="0"/>
+              <a:t>Work Models &amp; Affinity Diagram</a:t>
+            </a:r>
+            <a:endParaRPr lang="en-US" dirty="0"/>
+          </a:p>
+        </p:txBody>
+      </p:sp>
+      <p:sp>
+        <p:nvSpPr>
+          <p:cNvPr id="6" name="TextBox 5"/>
+          <p:cNvSpPr txBox="1"/>
+          <p:nvPr/>
+        </p:nvSpPr>
+        <p:spPr>
+          <a:xfrm>
+            <a:off x="8415555" y="6363222"/>
+            <a:ext cx="3062341" cy="369332"/>
+          </a:xfrm>
+          <a:prstGeom prst="rect">
+            <a:avLst/>
+          </a:prstGeom>
+          <a:noFill/>
+        </p:spPr>
+        <p:txBody>
+          <a:bodyPr wrap="square" rtlCol="0">
+            <a:spAutoFit/>
+          </a:bodyPr>
+          <a:lstStyle/>
+          <a:p>
+            <a:r>
+              <a:rPr lang="en-US" dirty="0" smtClean="0"/>
+              <a:t>Team Member: </a:t>
+            </a:r>
+            <a:r>
+              <a:rPr lang="en-US" dirty="0" smtClean="0"/>
+              <a:t>Jack Flowers</a:t>
+            </a:r>
+            <a:endParaRPr lang="en-US" dirty="0"/>
+          </a:p>
+        </p:txBody>
+      </p:sp>
+    </p:spTree>
+    <p:extLst>
+      <p:ext uri="{BB962C8B-B14F-4D97-AF65-F5344CB8AC3E}">
+        <p14:creationId xmlns:p14="http://schemas.microsoft.com/office/powerpoint/2010/main" val="3477196545"/>
+      </p:ext>
+    </p:extLst>
+  </p:cSld>
+  <p:clrMapOvr>
+    <a:masterClrMapping/>
+  </p:clrMapOvr>
+</p:sld>
+</file>
+
+<file path=ppt/slides/slide7.xml><?xml version="1.0" encoding="utf-8"?>
+<p:sld xmlns:a="http://schemas.openxmlformats.org/drawingml/2006/main" xmlns:r="http://schemas.openxmlformats.org/officeDocument/2006/relationships" xmlns:p="http://schemas.openxmlformats.org/presentationml/2006/main">
+  <p:cSld>
+    <p:spTree>
+      <p:nvGrpSpPr>
+        <p:cNvPr id="1" name=""/>
+        <p:cNvGrpSpPr/>
+        <p:nvPr/>
+      </p:nvGrpSpPr>
+      <p:grpSpPr>
+        <a:xfrm>
+          <a:off x="0" y="0"/>
+          <a:ext cx="0" cy="0"/>
+          <a:chOff x="0" y="0"/>
+          <a:chExt cx="0" cy="0"/>
+        </a:xfrm>
+      </p:grpSpPr>
+      <p:sp>
+        <p:nvSpPr>
+          <p:cNvPr id="2" name="Title 1"/>
+          <p:cNvSpPr>
+            <a:spLocks noGrp="1"/>
+          </p:cNvSpPr>
+          <p:nvPr>
+            <p:ph type="title"/>
+          </p:nvPr>
+        </p:nvSpPr>
+        <p:spPr/>
+        <p:txBody>
+          <a:bodyPr/>
+          <a:lstStyle/>
+          <a:p>
+            <a:pPr algn="ctr"/>
+            <a:r>
+              <a:rPr lang="en-US" dirty="0" smtClean="0"/>
+              <a:t>Flow Model</a:t>
+            </a:r>
+            <a:endParaRPr lang="en-US" dirty="0"/>
+          </a:p>
+        </p:txBody>
+      </p:sp>
+      <p:sp>
+        <p:nvSpPr>
+          <p:cNvPr id="3" name="Content Placeholder 2"/>
+          <p:cNvSpPr>
+            <a:spLocks noGrp="1"/>
+          </p:cNvSpPr>
+          <p:nvPr>
+            <p:ph idx="1"/>
+          </p:nvPr>
+        </p:nvSpPr>
+        <p:spPr/>
+        <p:txBody>
+          <a:bodyPr/>
+          <a:lstStyle/>
+          <a:p>
+            <a:endParaRPr lang="en-US" dirty="0"/>
+          </a:p>
+        </p:txBody>
+      </p:sp>
+      <p:sp>
+        <p:nvSpPr>
+          <p:cNvPr id="4" name="TextBox 3"/>
+          <p:cNvSpPr txBox="1"/>
+          <p:nvPr/>
+        </p:nvSpPr>
+        <p:spPr>
+          <a:xfrm>
+            <a:off x="838200" y="6363222"/>
+            <a:ext cx="1591358" cy="369332"/>
+          </a:xfrm>
+          <a:prstGeom prst="rect">
+            <a:avLst/>
+          </a:prstGeom>
+          <a:noFill/>
+        </p:spPr>
+        <p:txBody>
+          <a:bodyPr wrap="square" rtlCol="0">
+            <a:spAutoFit/>
+          </a:bodyPr>
+          <a:lstStyle/>
+          <a:p>
+            <a:r>
+              <a:rPr lang="en-US" dirty="0" smtClean="0"/>
+              <a:t>Team Octopus</a:t>
+            </a:r>
+            <a:endParaRPr lang="en-US" dirty="0"/>
+          </a:p>
+        </p:txBody>
+      </p:sp>
+      <p:sp>
+        <p:nvSpPr>
+          <p:cNvPr id="5" name="TextBox 4"/>
+          <p:cNvSpPr txBox="1"/>
+          <p:nvPr/>
+        </p:nvSpPr>
+        <p:spPr>
+          <a:xfrm>
+            <a:off x="4385181" y="6363222"/>
+            <a:ext cx="3421637" cy="369332"/>
+          </a:xfrm>
+          <a:prstGeom prst="rect">
+            <a:avLst/>
+          </a:prstGeom>
+          <a:noFill/>
+        </p:spPr>
+        <p:txBody>
+          <a:bodyPr wrap="square" rtlCol="0">
+            <a:spAutoFit/>
+          </a:bodyPr>
+          <a:lstStyle/>
+          <a:p>
+            <a:r>
+              <a:rPr lang="en-US" dirty="0" smtClean="0"/>
+              <a:t>Work Models &amp; Affinity Diagram</a:t>
+            </a:r>
+            <a:endParaRPr lang="en-US" dirty="0"/>
+          </a:p>
+        </p:txBody>
+      </p:sp>
+      <p:sp>
+        <p:nvSpPr>
+          <p:cNvPr id="6" name="TextBox 5"/>
+          <p:cNvSpPr txBox="1"/>
+          <p:nvPr/>
+        </p:nvSpPr>
+        <p:spPr>
+          <a:xfrm>
+            <a:off x="8415555" y="6363222"/>
+            <a:ext cx="3062341" cy="369332"/>
+          </a:xfrm>
+          <a:prstGeom prst="rect">
+            <a:avLst/>
+          </a:prstGeom>
+          <a:noFill/>
+        </p:spPr>
+        <p:txBody>
+          <a:bodyPr wrap="square" rtlCol="0">
+            <a:spAutoFit/>
+          </a:bodyPr>
+          <a:lstStyle/>
+          <a:p>
+            <a:r>
+              <a:rPr lang="en-US" dirty="0" smtClean="0"/>
+              <a:t>Team Member: </a:t>
+            </a:r>
+            <a:r>
+              <a:rPr lang="en-US" dirty="0" smtClean="0"/>
+              <a:t>Jack Flowers</a:t>
+            </a:r>
+            <a:endParaRPr lang="en-US" dirty="0"/>
+          </a:p>
+        </p:txBody>
+      </p:sp>
+    </p:spTree>
+    <p:extLst>
+      <p:ext uri="{BB962C8B-B14F-4D97-AF65-F5344CB8AC3E}">
+        <p14:creationId xmlns:p14="http://schemas.microsoft.com/office/powerpoint/2010/main" val="2873540795"/>
+      </p:ext>
+    </p:extLst>
+  </p:cSld>
+  <p:clrMapOvr>
+    <a:masterClrMapping/>
+  </p:clrMapOvr>
+</p:sld>
+</file>
+
+<file path=ppt/slides/slide8.xml><?xml version="1.0" encoding="utf-8"?>
+<p:sld xmlns:a="http://schemas.openxmlformats.org/drawingml/2006/main" xmlns:r="http://schemas.openxmlformats.org/officeDocument/2006/relationships" xmlns:p="http://schemas.openxmlformats.org/presentationml/2006/main">
+  <p:cSld>
+    <p:spTree>
+      <p:nvGrpSpPr>
+        <p:cNvPr id="1" name=""/>
+        <p:cNvGrpSpPr/>
+        <p:nvPr/>
+      </p:nvGrpSpPr>
+      <p:grpSpPr>
+        <a:xfrm>
+          <a:off x="0" y="0"/>
+          <a:ext cx="0" cy="0"/>
+          <a:chOff x="0" y="0"/>
+          <a:chExt cx="0" cy="0"/>
+        </a:xfrm>
+      </p:grpSpPr>
+      <p:sp>
+        <p:nvSpPr>
+          <p:cNvPr id="2" name="Title 1"/>
+          <p:cNvSpPr>
+            <a:spLocks noGrp="1"/>
+          </p:cNvSpPr>
+          <p:nvPr>
+            <p:ph type="title"/>
+          </p:nvPr>
+        </p:nvSpPr>
+        <p:spPr/>
+        <p:txBody>
+          <a:bodyPr/>
+          <a:lstStyle/>
+          <a:p>
+            <a:pPr algn="ctr"/>
+            <a:r>
+              <a:rPr lang="en-US" dirty="0" smtClean="0"/>
+              <a:t>Cultural Model</a:t>
+            </a:r>
+            <a:endParaRPr lang="en-US" dirty="0"/>
+          </a:p>
+        </p:txBody>
+      </p:sp>
+      <p:sp>
+        <p:nvSpPr>
+          <p:cNvPr id="3" name="Content Placeholder 2"/>
+          <p:cNvSpPr>
+            <a:spLocks noGrp="1"/>
+          </p:cNvSpPr>
+          <p:nvPr>
+            <p:ph idx="1"/>
+          </p:nvPr>
+        </p:nvSpPr>
+        <p:spPr/>
+        <p:txBody>
+          <a:bodyPr/>
+          <a:lstStyle/>
+          <a:p>
+            <a:endParaRPr lang="en-US" dirty="0"/>
+          </a:p>
+        </p:txBody>
+      </p:sp>
+      <p:sp>
+        <p:nvSpPr>
+          <p:cNvPr id="4" name="TextBox 3"/>
+          <p:cNvSpPr txBox="1"/>
+          <p:nvPr/>
+        </p:nvSpPr>
+        <p:spPr>
+          <a:xfrm>
+            <a:off x="838200" y="6363222"/>
+            <a:ext cx="1591358" cy="369332"/>
+          </a:xfrm>
+          <a:prstGeom prst="rect">
+            <a:avLst/>
+          </a:prstGeom>
+          <a:noFill/>
+        </p:spPr>
+        <p:txBody>
+          <a:bodyPr wrap="square" rtlCol="0">
+            <a:spAutoFit/>
+          </a:bodyPr>
+          <a:lstStyle/>
+          <a:p>
+            <a:r>
+              <a:rPr lang="en-US" dirty="0" smtClean="0"/>
+              <a:t>Team Octopus</a:t>
+            </a:r>
+            <a:endParaRPr lang="en-US" dirty="0"/>
+          </a:p>
+        </p:txBody>
+      </p:sp>
+      <p:sp>
+        <p:nvSpPr>
+          <p:cNvPr id="5" name="TextBox 4"/>
+          <p:cNvSpPr txBox="1"/>
+          <p:nvPr/>
+        </p:nvSpPr>
+        <p:spPr>
+          <a:xfrm>
+            <a:off x="4385181" y="6363222"/>
+            <a:ext cx="3421637" cy="369332"/>
+          </a:xfrm>
+          <a:prstGeom prst="rect">
+            <a:avLst/>
+          </a:prstGeom>
+          <a:noFill/>
+        </p:spPr>
+        <p:txBody>
+          <a:bodyPr wrap="square" rtlCol="0">
+            <a:spAutoFit/>
+          </a:bodyPr>
+          <a:lstStyle/>
+          <a:p>
+            <a:r>
+              <a:rPr lang="en-US" dirty="0" smtClean="0"/>
+              <a:t>Work Models &amp; Affinity Diagram</a:t>
+            </a:r>
+            <a:endParaRPr lang="en-US" dirty="0"/>
+          </a:p>
+        </p:txBody>
+      </p:sp>
+      <p:sp>
+        <p:nvSpPr>
+          <p:cNvPr id="6" name="TextBox 5"/>
+          <p:cNvSpPr txBox="1"/>
+          <p:nvPr/>
+        </p:nvSpPr>
+        <p:spPr>
+          <a:xfrm>
+            <a:off x="8415555" y="6363222"/>
+            <a:ext cx="3062341" cy="369332"/>
+          </a:xfrm>
+          <a:prstGeom prst="rect">
+            <a:avLst/>
+          </a:prstGeom>
+          <a:noFill/>
+        </p:spPr>
+        <p:txBody>
+          <a:bodyPr wrap="square" rtlCol="0">
+            <a:spAutoFit/>
+          </a:bodyPr>
+          <a:lstStyle/>
+          <a:p>
+            <a:r>
+              <a:rPr lang="en-US" dirty="0" smtClean="0"/>
+              <a:t>Team Member: </a:t>
+            </a:r>
+            <a:r>
+              <a:rPr lang="en-US" dirty="0" smtClean="0"/>
+              <a:t>Jack Flowers</a:t>
+            </a:r>
+            <a:endParaRPr lang="en-US" dirty="0"/>
+          </a:p>
+        </p:txBody>
+      </p:sp>
+    </p:spTree>
+    <p:extLst>
+      <p:ext uri="{BB962C8B-B14F-4D97-AF65-F5344CB8AC3E}">
+        <p14:creationId xmlns:p14="http://schemas.microsoft.com/office/powerpoint/2010/main" val="413125061"/>
+      </p:ext>
+    </p:extLst>
+  </p:cSld>
+  <p:clrMapOvr>
+    <a:masterClrMapping/>
+  </p:clrMapOvr>
+</p:sld>
+</file>
+
+<file path=ppt/slides/slide9.xml><?xml version="1.0" encoding="utf-8"?>
+<p:sld xmlns:a="http://schemas.openxmlformats.org/drawingml/2006/main" xmlns:r="http://schemas.openxmlformats.org/officeDocument/2006/relationships" xmlns:p="http://schemas.openxmlformats.org/presentationml/2006/main">
+  <p:cSld>
+    <p:spTree>
+      <p:nvGrpSpPr>
+        <p:cNvPr id="1" name=""/>
+        <p:cNvGrpSpPr/>
+        <p:nvPr/>
+      </p:nvGrpSpPr>
+      <p:grpSpPr>
+        <a:xfrm>
+          <a:off x="0" y="0"/>
+          <a:ext cx="0" cy="0"/>
+          <a:chOff x="0" y="0"/>
+          <a:chExt cx="0" cy="0"/>
+        </a:xfrm>
+      </p:grpSpPr>
+      <p:sp>
+        <p:nvSpPr>
+          <p:cNvPr id="2" name="Title 1"/>
+          <p:cNvSpPr>
+            <a:spLocks noGrp="1"/>
+          </p:cNvSpPr>
+          <p:nvPr>
+            <p:ph type="title"/>
+          </p:nvPr>
+        </p:nvSpPr>
+        <p:spPr/>
+        <p:txBody>
+          <a:bodyPr/>
+          <a:lstStyle/>
+          <a:p>
+            <a:pPr algn="ctr"/>
+            <a:r>
+              <a:rPr lang="en-US" dirty="0" smtClean="0"/>
+              <a:t>Sequence Model</a:t>
+            </a:r>
+            <a:endParaRPr lang="en-US" dirty="0"/>
+          </a:p>
+        </p:txBody>
+      </p:sp>
+      <p:sp>
+        <p:nvSpPr>
+          <p:cNvPr id="3" name="Content Placeholder 2"/>
+          <p:cNvSpPr>
+            <a:spLocks noGrp="1"/>
+          </p:cNvSpPr>
+          <p:nvPr>
+            <p:ph idx="1"/>
+          </p:nvPr>
+        </p:nvSpPr>
+        <p:spPr/>
+        <p:txBody>
+          <a:bodyPr/>
+          <a:lstStyle/>
+          <a:p>
+            <a:endParaRPr lang="en-US" dirty="0"/>
+          </a:p>
+        </p:txBody>
+      </p:sp>
+      <p:sp>
+        <p:nvSpPr>
+          <p:cNvPr id="4" name="TextBox 3"/>
+          <p:cNvSpPr txBox="1"/>
+          <p:nvPr/>
+        </p:nvSpPr>
+        <p:spPr>
+          <a:xfrm>
+            <a:off x="838200" y="6363222"/>
+            <a:ext cx="1591358" cy="369332"/>
+          </a:xfrm>
+          <a:prstGeom prst="rect">
+            <a:avLst/>
+          </a:prstGeom>
+          <a:noFill/>
+        </p:spPr>
+        <p:txBody>
+          <a:bodyPr wrap="square" rtlCol="0">
+            <a:spAutoFit/>
+          </a:bodyPr>
+          <a:lstStyle/>
+          <a:p>
+            <a:r>
+              <a:rPr lang="en-US" dirty="0" smtClean="0"/>
+              <a:t>Team Octopus</a:t>
+            </a:r>
+            <a:endParaRPr lang="en-US" dirty="0"/>
+          </a:p>
+        </p:txBody>
+      </p:sp>
+      <p:sp>
+        <p:nvSpPr>
+          <p:cNvPr id="5" name="TextBox 4"/>
+          <p:cNvSpPr txBox="1"/>
+          <p:nvPr/>
+        </p:nvSpPr>
+        <p:spPr>
+          <a:xfrm>
+            <a:off x="4385181" y="6363222"/>
+            <a:ext cx="3421637" cy="369332"/>
+          </a:xfrm>
+          <a:prstGeom prst="rect">
+            <a:avLst/>
+          </a:prstGeom>
+          <a:noFill/>
+        </p:spPr>
+        <p:txBody>
+          <a:bodyPr wrap="square" rtlCol="0">
+            <a:spAutoFit/>
+          </a:bodyPr>
+          <a:lstStyle/>
+          <a:p>
+            <a:r>
+              <a:rPr lang="en-US" dirty="0" smtClean="0"/>
+              <a:t>Work Models &amp; Affinity Diagram</a:t>
+            </a:r>
+            <a:endParaRPr lang="en-US" dirty="0"/>
+          </a:p>
+        </p:txBody>
+      </p:sp>
+      <p:sp>
+        <p:nvSpPr>
+          <p:cNvPr id="6" name="TextBox 5"/>
+          <p:cNvSpPr txBox="1"/>
+          <p:nvPr/>
+        </p:nvSpPr>
+        <p:spPr>
+          <a:xfrm>
+            <a:off x="8415555" y="6363222"/>
+            <a:ext cx="3062341" cy="369332"/>
+          </a:xfrm>
+          <a:prstGeom prst="rect">
+            <a:avLst/>
+          </a:prstGeom>
+          <a:noFill/>
+        </p:spPr>
+        <p:txBody>
+          <a:bodyPr wrap="square" rtlCol="0">
+            <a:spAutoFit/>
+          </a:bodyPr>
+          <a:lstStyle/>
+          <a:p>
+            <a:r>
+              <a:rPr lang="en-US" dirty="0" smtClean="0"/>
+              <a:t>Team Member: </a:t>
+            </a:r>
+            <a:r>
+              <a:rPr lang="en-US" dirty="0" smtClean="0"/>
+              <a:t>Jack Flowers</a:t>
+            </a:r>
+            <a:endParaRPr lang="en-US" dirty="0"/>
+          </a:p>
+        </p:txBody>
+      </p:sp>
+    </p:spTree>
+    <p:extLst>
+      <p:ext uri="{BB962C8B-B14F-4D97-AF65-F5344CB8AC3E}">
+        <p14:creationId xmlns:p14="http://schemas.microsoft.com/office/powerpoint/2010/main" val="3858493607"/>
       </p:ext>
     </p:extLst>
   </p:cSld>

</xml_diff>